<commit_message>
work on collinearity chapter
</commit_message>
<xml_diff>
--- a/images/collinearity.pptx
+++ b/images/collinearity.pptx
@@ -5,12 +5,13 @@
     <p:sldMasterId id="2147483648" r:id="rId1"/>
   </p:sldMasterIdLst>
   <p:notesMasterIdLst>
-    <p:notesMasterId r:id="rId5"/>
+    <p:notesMasterId r:id="rId6"/>
   </p:notesMasterIdLst>
   <p:sldIdLst>
     <p:sldId id="260" r:id="rId2"/>
     <p:sldId id="262" r:id="rId3"/>
     <p:sldId id="263" r:id="rId4"/>
+    <p:sldId id="264" r:id="rId5"/>
   </p:sldIdLst>
   <p:sldSz cx="12192000" cy="6858000"/>
   <p:notesSz cx="6858000" cy="9144000"/>
@@ -109,6 +110,11 @@
       </a:defRPr>
     </a:lvl9pPr>
   </p:defaultTextStyle>
+  <p:extLst>
+    <p:ext uri="{EFAFB233-063F-42B5-8137-9DF3F51BA10A}">
+      <p15:sldGuideLst xmlns:p15="http://schemas.microsoft.com/office/powerpoint/2012/main"/>
+    </p:ext>
+  </p:extLst>
 </p:presentation>
 </file>
 
@@ -194,7 +200,7 @@
           <a:p>
             <a:fld id="{1D7B67F1-19D3-408A-945C-B546A944A4C8}" type="datetimeFigureOut">
               <a:rPr lang="en-CA" smtClean="0"/>
-              <a:t>2023-08-16</a:t>
+              <a:t>2023-08-17</a:t>
             </a:fld>
             <a:endParaRPr lang="en-CA"/>
           </a:p>
@@ -863,7 +869,7 @@
           <a:p>
             <a:fld id="{882DB5D0-3735-4A17-A2A4-BC1F949326B7}" type="datetimeFigureOut">
               <a:rPr lang="en-CA" smtClean="0"/>
-              <a:t>2023-08-16</a:t>
+              <a:t>2023-08-17</a:t>
             </a:fld>
             <a:endParaRPr lang="en-CA"/>
           </a:p>
@@ -1063,7 +1069,7 @@
           <a:p>
             <a:fld id="{882DB5D0-3735-4A17-A2A4-BC1F949326B7}" type="datetimeFigureOut">
               <a:rPr lang="en-CA" smtClean="0"/>
-              <a:t>2023-08-16</a:t>
+              <a:t>2023-08-17</a:t>
             </a:fld>
             <a:endParaRPr lang="en-CA"/>
           </a:p>
@@ -1273,7 +1279,7 @@
           <a:p>
             <a:fld id="{882DB5D0-3735-4A17-A2A4-BC1F949326B7}" type="datetimeFigureOut">
               <a:rPr lang="en-CA" smtClean="0"/>
-              <a:t>2023-08-16</a:t>
+              <a:t>2023-08-17</a:t>
             </a:fld>
             <a:endParaRPr lang="en-CA"/>
           </a:p>
@@ -1473,7 +1479,7 @@
           <a:p>
             <a:fld id="{882DB5D0-3735-4A17-A2A4-BC1F949326B7}" type="datetimeFigureOut">
               <a:rPr lang="en-CA" smtClean="0"/>
-              <a:t>2023-08-16</a:t>
+              <a:t>2023-08-17</a:t>
             </a:fld>
             <a:endParaRPr lang="en-CA"/>
           </a:p>
@@ -1749,7 +1755,7 @@
           <a:p>
             <a:fld id="{882DB5D0-3735-4A17-A2A4-BC1F949326B7}" type="datetimeFigureOut">
               <a:rPr lang="en-CA" smtClean="0"/>
-              <a:t>2023-08-16</a:t>
+              <a:t>2023-08-17</a:t>
             </a:fld>
             <a:endParaRPr lang="en-CA"/>
           </a:p>
@@ -2017,7 +2023,7 @@
           <a:p>
             <a:fld id="{882DB5D0-3735-4A17-A2A4-BC1F949326B7}" type="datetimeFigureOut">
               <a:rPr lang="en-CA" smtClean="0"/>
-              <a:t>2023-08-16</a:t>
+              <a:t>2023-08-17</a:t>
             </a:fld>
             <a:endParaRPr lang="en-CA"/>
           </a:p>
@@ -2432,7 +2438,7 @@
           <a:p>
             <a:fld id="{882DB5D0-3735-4A17-A2A4-BC1F949326B7}" type="datetimeFigureOut">
               <a:rPr lang="en-CA" smtClean="0"/>
-              <a:t>2023-08-16</a:t>
+              <a:t>2023-08-17</a:t>
             </a:fld>
             <a:endParaRPr lang="en-CA"/>
           </a:p>
@@ -2574,7 +2580,7 @@
           <a:p>
             <a:fld id="{882DB5D0-3735-4A17-A2A4-BC1F949326B7}" type="datetimeFigureOut">
               <a:rPr lang="en-CA" smtClean="0"/>
-              <a:t>2023-08-16</a:t>
+              <a:t>2023-08-17</a:t>
             </a:fld>
             <a:endParaRPr lang="en-CA"/>
           </a:p>
@@ -2687,7 +2693,7 @@
           <a:p>
             <a:fld id="{882DB5D0-3735-4A17-A2A4-BC1F949326B7}" type="datetimeFigureOut">
               <a:rPr lang="en-CA" smtClean="0"/>
-              <a:t>2023-08-16</a:t>
+              <a:t>2023-08-17</a:t>
             </a:fld>
             <a:endParaRPr lang="en-CA"/>
           </a:p>
@@ -3000,7 +3006,7 @@
           <a:p>
             <a:fld id="{882DB5D0-3735-4A17-A2A4-BC1F949326B7}" type="datetimeFigureOut">
               <a:rPr lang="en-CA" smtClean="0"/>
-              <a:t>2023-08-16</a:t>
+              <a:t>2023-08-17</a:t>
             </a:fld>
             <a:endParaRPr lang="en-CA"/>
           </a:p>
@@ -3289,7 +3295,7 @@
           <a:p>
             <a:fld id="{882DB5D0-3735-4A17-A2A4-BC1F949326B7}" type="datetimeFigureOut">
               <a:rPr lang="en-CA" smtClean="0"/>
-              <a:t>2023-08-16</a:t>
+              <a:t>2023-08-17</a:t>
             </a:fld>
             <a:endParaRPr lang="en-CA"/>
           </a:p>
@@ -3532,7 +3538,7 @@
           <a:p>
             <a:fld id="{882DB5D0-3735-4A17-A2A4-BC1F949326B7}" type="datetimeFigureOut">
               <a:rPr lang="en-CA" smtClean="0"/>
-              <a:t>2023-08-16</a:t>
+              <a:t>2023-08-17</a:t>
             </a:fld>
             <a:endParaRPr lang="en-CA"/>
           </a:p>
@@ -4110,76 +4116,6 @@
       </p:sp>
       <p:sp>
         <p:nvSpPr>
-          <p:cNvPr id="12295" name="Text Box 7"/>
-          <p:cNvSpPr txBox="1">
-            <a:spLocks noChangeArrowheads="1"/>
-          </p:cNvSpPr>
-          <p:nvPr/>
-        </p:nvSpPr>
-        <p:spPr bwMode="auto">
-          <a:xfrm>
-            <a:off x="4876800" y="4038601"/>
-            <a:ext cx="1371600" cy="366713"/>
-          </a:xfrm>
-          <a:prstGeom prst="rect">
-            <a:avLst/>
-          </a:prstGeom>
-          <a:noFill/>
-          <a:ln>
-            <a:noFill/>
-          </a:ln>
-          <a:effectLst/>
-          <a:extLst>
-            <a:ext uri="{909E8E84-426E-40DD-AFC4-6F175D3DCCD1}">
-              <a14:hiddenFill xmlns:a14="http://schemas.microsoft.com/office/drawing/2010/main">
-                <a:solidFill>
-                  <a:schemeClr val="accent1"/>
-                </a:solidFill>
-              </a14:hiddenFill>
-            </a:ext>
-            <a:ext uri="{91240B29-F687-4F45-9708-019B960494DF}">
-              <a14:hiddenLine xmlns:a14="http://schemas.microsoft.com/office/drawing/2010/main" w="9525">
-                <a:solidFill>
-                  <a:schemeClr val="tx1"/>
-                </a:solidFill>
-                <a:miter lim="800000"/>
-                <a:headEnd/>
-                <a:tailEnd/>
-              </a14:hiddenLine>
-            </a:ext>
-            <a:ext uri="{AF507438-7753-43E0-B8FC-AC1667EBCBE1}">
-              <a14:hiddenEffects xmlns:a14="http://schemas.microsoft.com/office/drawing/2010/main">
-                <a:effectLst>
-                  <a:outerShdw dist="35921" dir="2700000" algn="ctr" rotWithShape="0">
-                    <a:schemeClr val="bg2"/>
-                  </a:outerShdw>
-                </a:effectLst>
-              </a14:hiddenEffects>
-            </a:ext>
-          </a:extLst>
-        </p:spPr>
-        <p:txBody>
-          <a:bodyPr>
-            <a:spAutoFit/>
-          </a:bodyPr>
-          <a:lstStyle/>
-          <a:p>
-            <a:pPr algn="l">
-              <a:spcBef>
-                <a:spcPct val="50000"/>
-              </a:spcBef>
-            </a:pPr>
-            <a:r>
-              <a:rPr lang="en-US" altLang="en-US">
-                <a:latin typeface="Arial" pitchFamily="34" charset="0"/>
-              </a:rPr>
-              <a:t>fitted value</a:t>
-            </a:r>
-          </a:p>
-        </p:txBody>
-      </p:sp>
-      <p:sp>
-        <p:nvSpPr>
           <p:cNvPr id="12296" name="Rectangle 8"/>
           <p:cNvSpPr>
             <a:spLocks noChangeArrowheads="1"/>
@@ -4495,6 +4431,76 @@
           </a:p>
         </p:txBody>
       </p:sp>
+      <p:sp>
+        <p:nvSpPr>
+          <p:cNvPr id="12295" name="Text Box 7"/>
+          <p:cNvSpPr txBox="1">
+            <a:spLocks noChangeArrowheads="1"/>
+          </p:cNvSpPr>
+          <p:nvPr/>
+        </p:nvSpPr>
+        <p:spPr bwMode="auto">
+          <a:xfrm>
+            <a:off x="5143500" y="3821668"/>
+            <a:ext cx="1371600" cy="369332"/>
+          </a:xfrm>
+          <a:prstGeom prst="rect">
+            <a:avLst/>
+          </a:prstGeom>
+          <a:noFill/>
+          <a:ln>
+            <a:noFill/>
+          </a:ln>
+          <a:effectLst/>
+          <a:extLst>
+            <a:ext uri="{909E8E84-426E-40DD-AFC4-6F175D3DCCD1}">
+              <a14:hiddenFill xmlns:a14="http://schemas.microsoft.com/office/drawing/2010/main">
+                <a:solidFill>
+                  <a:schemeClr val="accent1"/>
+                </a:solidFill>
+              </a14:hiddenFill>
+            </a:ext>
+            <a:ext uri="{91240B29-F687-4F45-9708-019B960494DF}">
+              <a14:hiddenLine xmlns:a14="http://schemas.microsoft.com/office/drawing/2010/main" w="9525">
+                <a:solidFill>
+                  <a:schemeClr val="tx1"/>
+                </a:solidFill>
+                <a:miter lim="800000"/>
+                <a:headEnd/>
+                <a:tailEnd/>
+              </a14:hiddenLine>
+            </a:ext>
+            <a:ext uri="{AF507438-7753-43E0-B8FC-AC1667EBCBE1}">
+              <a14:hiddenEffects xmlns:a14="http://schemas.microsoft.com/office/drawing/2010/main">
+                <a:effectLst>
+                  <a:outerShdw dist="35921" dir="2700000" algn="ctr" rotWithShape="0">
+                    <a:schemeClr val="bg2"/>
+                  </a:outerShdw>
+                </a:effectLst>
+              </a14:hiddenEffects>
+            </a:ext>
+          </a:extLst>
+        </p:spPr>
+        <p:txBody>
+          <a:bodyPr>
+            <a:spAutoFit/>
+          </a:bodyPr>
+          <a:lstStyle/>
+          <a:p>
+            <a:pPr algn="l">
+              <a:spcBef>
+                <a:spcPct val="50000"/>
+              </a:spcBef>
+            </a:pPr>
+            <a:r>
+              <a:rPr lang="en-US" altLang="en-US" dirty="0">
+                <a:latin typeface="Arial" pitchFamily="34" charset="0"/>
+              </a:rPr>
+              <a:t>Fitted value </a:t>
+            </a:r>
+          </a:p>
+        </p:txBody>
+      </p:sp>
     </p:spTree>
   </p:cSld>
   <p:clrMapOvr>
@@ -4544,264 +4550,413 @@
           </a:p>
         </p:txBody>
       </p:sp>
-      <p:pic>
-        <p:nvPicPr>
-          <p:cNvPr id="15364" name="Picture 4" descr="3cases-b"/>
-          <p:cNvPicPr>
-            <a:picLocks noChangeAspect="1" noChangeArrowheads="1"/>
-          </p:cNvPicPr>
+      <p:grpSp>
+        <p:nvGrpSpPr>
+          <p:cNvPr id="7" name="Group 6">
+            <a:extLst>
+              <a:ext uri="{FF2B5EF4-FFF2-40B4-BE49-F238E27FC236}">
+                <a16:creationId xmlns:a16="http://schemas.microsoft.com/office/drawing/2014/main" id="{D6BD44EF-1DD3-5B9E-D2E9-826CE4BED87B}"/>
+              </a:ext>
+            </a:extLst>
+          </p:cNvPr>
+          <p:cNvGrpSpPr/>
           <p:nvPr/>
-        </p:nvPicPr>
-        <p:blipFill>
-          <a:blip r:embed="rId3">
-            <a:extLst>
-              <a:ext uri="{28A0092B-C50C-407E-A947-70E740481C1C}">
-                <a14:useLocalDpi xmlns:a14="http://schemas.microsoft.com/office/drawing/2010/main" val="0"/>
-              </a:ext>
-            </a:extLst>
-          </a:blip>
-          <a:srcRect/>
-          <a:stretch>
-            <a:fillRect/>
-          </a:stretch>
-        </p:blipFill>
-        <p:spPr bwMode="auto">
+        </p:nvGrpSpPr>
+        <p:grpSpPr>
           <a:xfrm>
             <a:off x="5410200" y="1600201"/>
-            <a:ext cx="4953000" cy="4600575"/>
+            <a:ext cx="5028306" cy="4725431"/>
+            <a:chOff x="5410200" y="1600201"/>
+            <a:chExt cx="5028306" cy="4725431"/>
           </a:xfrm>
-          <a:prstGeom prst="rect">
-            <a:avLst/>
-          </a:prstGeom>
-          <a:noFill/>
-          <a:extLst>
-            <a:ext uri="{909E8E84-426E-40DD-AFC4-6F175D3DCCD1}">
-              <a14:hiddenFill xmlns:a14="http://schemas.microsoft.com/office/drawing/2010/main">
-                <a:solidFill>
-                  <a:srgbClr val="FFFFFF"/>
-                </a:solidFill>
-              </a14:hiddenFill>
-            </a:ext>
-          </a:extLst>
-        </p:spPr>
-      </p:pic>
-      <p:sp>
-        <p:nvSpPr>
-          <p:cNvPr id="15366" name="Text Box 6"/>
-          <p:cNvSpPr txBox="1">
-            <a:spLocks noChangeArrowheads="1"/>
-          </p:cNvSpPr>
-          <p:nvPr/>
-        </p:nvSpPr>
-        <p:spPr bwMode="auto">
-          <a:xfrm>
-            <a:off x="8304906" y="5495370"/>
-            <a:ext cx="2133600" cy="641350"/>
-          </a:xfrm>
-          <a:prstGeom prst="rect">
-            <a:avLst/>
-          </a:prstGeom>
-          <a:noFill/>
-          <a:ln>
+        </p:grpSpPr>
+        <p:pic>
+          <p:nvPicPr>
+            <p:cNvPr id="15364" name="Picture 4" descr="3cases-b"/>
+            <p:cNvPicPr>
+              <a:picLocks noChangeAspect="1" noChangeArrowheads="1"/>
+            </p:cNvPicPr>
+            <p:nvPr/>
+          </p:nvPicPr>
+          <p:blipFill>
+            <a:blip r:embed="rId3">
+              <a:extLst>
+                <a:ext uri="{28A0092B-C50C-407E-A947-70E740481C1C}">
+                  <a14:useLocalDpi xmlns:a14="http://schemas.microsoft.com/office/drawing/2010/main" val="0"/>
+                </a:ext>
+              </a:extLst>
+            </a:blip>
+            <a:srcRect/>
+            <a:stretch>
+              <a:fillRect/>
+            </a:stretch>
+          </p:blipFill>
+          <p:spPr bwMode="auto">
+            <a:xfrm>
+              <a:off x="5410200" y="1600201"/>
+              <a:ext cx="4953000" cy="4600575"/>
+            </a:xfrm>
+            <a:prstGeom prst="rect">
+              <a:avLst/>
+            </a:prstGeom>
             <a:noFill/>
-          </a:ln>
-          <a:effectLst/>
-          <a:extLst>
-            <a:ext uri="{909E8E84-426E-40DD-AFC4-6F175D3DCCD1}">
-              <a14:hiddenFill xmlns:a14="http://schemas.microsoft.com/office/drawing/2010/main">
-                <a:solidFill>
-                  <a:srgbClr val="FFFFFF"/>
-                </a:solidFill>
-              </a14:hiddenFill>
-            </a:ext>
-            <a:ext uri="{91240B29-F687-4F45-9708-019B960494DF}">
-              <a14:hiddenLine xmlns:a14="http://schemas.microsoft.com/office/drawing/2010/main" w="22225" algn="ctr">
-                <a:solidFill>
-                  <a:srgbClr val="FF0000"/>
-                </a:solidFill>
-                <a:miter lim="800000"/>
-                <a:headEnd/>
-                <a:tailEnd type="none" w="med" len="lg"/>
-              </a14:hiddenLine>
-            </a:ext>
-            <a:ext uri="{AF507438-7753-43E0-B8FC-AC1667EBCBE1}">
-              <a14:hiddenEffects xmlns:a14="http://schemas.microsoft.com/office/drawing/2010/main">
-                <a:effectLst>
-                  <a:outerShdw dist="35921" dir="2700000" algn="ctr" rotWithShape="0">
-                    <a:schemeClr val="bg2"/>
-                  </a:outerShdw>
-                </a:effectLst>
-              </a14:hiddenEffects>
-            </a:ext>
-          </a:extLst>
-        </p:spPr>
-        <p:txBody>
-          <a:bodyPr>
-            <a:spAutoFit/>
-          </a:bodyPr>
-          <a:lstStyle/>
-          <a:p>
-            <a:pPr>
-              <a:spcBef>
-                <a:spcPct val="50000"/>
-              </a:spcBef>
-            </a:pPr>
-            <a:r>
-              <a:rPr lang="en-US" altLang="en-US" dirty="0">
-                <a:latin typeface="Arial" pitchFamily="34" charset="0"/>
-              </a:rPr>
-              <a:t>But: same predicted values!</a:t>
-            </a:r>
-          </a:p>
-        </p:txBody>
-      </p:sp>
-      <p:sp>
-        <p:nvSpPr>
-          <p:cNvPr id="15367" name="Line 7"/>
-          <p:cNvSpPr>
-            <a:spLocks noChangeShapeType="1"/>
-          </p:cNvSpPr>
-          <p:nvPr/>
-        </p:nvSpPr>
-        <p:spPr bwMode="auto">
-          <a:xfrm flipH="1" flipV="1">
-            <a:off x="8305800" y="5029200"/>
-            <a:ext cx="304800" cy="533400"/>
-          </a:xfrm>
-          <a:prstGeom prst="line">
-            <a:avLst/>
-          </a:prstGeom>
-          <a:noFill/>
-          <a:ln w="22225">
+            <a:extLst>
+              <a:ext uri="{909E8E84-426E-40DD-AFC4-6F175D3DCCD1}">
+                <a14:hiddenFill xmlns:a14="http://schemas.microsoft.com/office/drawing/2010/main">
+                  <a:solidFill>
+                    <a:srgbClr val="FFFFFF"/>
+                  </a:solidFill>
+                </a14:hiddenFill>
+              </a:ext>
+            </a:extLst>
+          </p:spPr>
+        </p:pic>
+        <p:sp>
+          <p:nvSpPr>
+            <p:cNvPr id="15366" name="Text Box 6"/>
+            <p:cNvSpPr txBox="1">
+              <a:spLocks noChangeArrowheads="1"/>
+            </p:cNvSpPr>
+            <p:nvPr/>
+          </p:nvSpPr>
+          <p:spPr bwMode="auto">
+            <a:xfrm>
+              <a:off x="8304906" y="5495370"/>
+              <a:ext cx="2133600" cy="641350"/>
+            </a:xfrm>
+            <a:prstGeom prst="rect">
+              <a:avLst/>
+            </a:prstGeom>
+            <a:noFill/>
+            <a:ln>
+              <a:noFill/>
+            </a:ln>
+            <a:effectLst/>
+            <a:extLst>
+              <a:ext uri="{909E8E84-426E-40DD-AFC4-6F175D3DCCD1}">
+                <a14:hiddenFill xmlns:a14="http://schemas.microsoft.com/office/drawing/2010/main">
+                  <a:solidFill>
+                    <a:srgbClr val="FFFFFF"/>
+                  </a:solidFill>
+                </a14:hiddenFill>
+              </a:ext>
+              <a:ext uri="{91240B29-F687-4F45-9708-019B960494DF}">
+                <a14:hiddenLine xmlns:a14="http://schemas.microsoft.com/office/drawing/2010/main" w="22225" algn="ctr">
+                  <a:solidFill>
+                    <a:srgbClr val="FF0000"/>
+                  </a:solidFill>
+                  <a:miter lim="800000"/>
+                  <a:headEnd/>
+                  <a:tailEnd type="none" w="med" len="lg"/>
+                </a14:hiddenLine>
+              </a:ext>
+              <a:ext uri="{AF507438-7753-43E0-B8FC-AC1667EBCBE1}">
+                <a14:hiddenEffects xmlns:a14="http://schemas.microsoft.com/office/drawing/2010/main">
+                  <a:effectLst>
+                    <a:outerShdw dist="35921" dir="2700000" algn="ctr" rotWithShape="0">
+                      <a:schemeClr val="bg2"/>
+                    </a:outerShdw>
+                  </a:effectLst>
+                </a14:hiddenEffects>
+              </a:ext>
+            </a:extLst>
+          </p:spPr>
+          <p:txBody>
+            <a:bodyPr>
+              <a:spAutoFit/>
+            </a:bodyPr>
+            <a:lstStyle/>
+            <a:p>
+              <a:pPr>
+                <a:spcBef>
+                  <a:spcPct val="50000"/>
+                </a:spcBef>
+              </a:pPr>
+              <a:r>
+                <a:rPr lang="en-US" altLang="en-US" dirty="0">
+                  <a:latin typeface="Arial" pitchFamily="34" charset="0"/>
+                </a:rPr>
+                <a:t>But: same predicted values!</a:t>
+              </a:r>
+            </a:p>
+          </p:txBody>
+        </p:sp>
+        <p:sp>
+          <p:nvSpPr>
+            <p:cNvPr id="15367" name="Line 7"/>
+            <p:cNvSpPr>
+              <a:spLocks noChangeShapeType="1"/>
+            </p:cNvSpPr>
+            <p:nvPr/>
+          </p:nvSpPr>
+          <p:spPr bwMode="auto">
+            <a:xfrm flipH="1" flipV="1">
+              <a:off x="8305800" y="5029200"/>
+              <a:ext cx="304800" cy="533400"/>
+            </a:xfrm>
+            <a:prstGeom prst="line">
+              <a:avLst/>
+            </a:prstGeom>
+            <a:noFill/>
+            <a:ln w="22225">
+              <a:solidFill>
+                <a:srgbClr val="FF0000"/>
+              </a:solidFill>
+              <a:round/>
+              <a:headEnd/>
+              <a:tailEnd type="triangle" w="med" len="lg"/>
+            </a:ln>
+            <a:effectLst/>
+            <a:extLst>
+              <a:ext uri="{909E8E84-426E-40DD-AFC4-6F175D3DCCD1}">
+                <a14:hiddenFill xmlns:a14="http://schemas.microsoft.com/office/drawing/2010/main">
+                  <a:noFill/>
+                </a14:hiddenFill>
+              </a:ext>
+              <a:ext uri="{AF507438-7753-43E0-B8FC-AC1667EBCBE1}">
+                <a14:hiddenEffects xmlns:a14="http://schemas.microsoft.com/office/drawing/2010/main">
+                  <a:effectLst>
+                    <a:outerShdw dist="35921" dir="2700000" algn="ctr" rotWithShape="0">
+                      <a:schemeClr val="bg2"/>
+                    </a:outerShdw>
+                  </a:effectLst>
+                </a14:hiddenEffects>
+              </a:ext>
+            </a:extLst>
+          </p:spPr>
+          <p:txBody>
+            <a:bodyPr/>
+            <a:lstStyle/>
+            <a:p>
+              <a:endParaRPr lang="en-US"/>
+            </a:p>
+          </p:txBody>
+        </p:sp>
+        <p:sp>
+          <p:nvSpPr>
+            <p:cNvPr id="2" name="TextBox 1"/>
+            <p:cNvSpPr txBox="1"/>
+            <p:nvPr/>
+          </p:nvSpPr>
+          <p:spPr>
+            <a:xfrm>
+              <a:off x="6300788" y="5956300"/>
+              <a:ext cx="1283353" cy="369332"/>
+            </a:xfrm>
+            <a:prstGeom prst="rect">
+              <a:avLst/>
+            </a:prstGeom>
+            <a:noFill/>
+          </p:spPr>
+          <p:txBody>
+            <a:bodyPr wrap="square" rtlCol="0">
+              <a:spAutoFit/>
+            </a:bodyPr>
+            <a:lstStyle/>
+            <a:p>
+              <a:r>
+                <a:rPr lang="en-US" dirty="0"/>
+                <a:t>r(x</a:t>
+              </a:r>
+              <a:r>
+                <a:rPr lang="en-US" baseline="-25000" dirty="0"/>
+                <a:t>1</a:t>
+              </a:r>
+              <a:r>
+                <a:rPr lang="en-US" dirty="0"/>
+                <a:t>,x</a:t>
+              </a:r>
+              <a:r>
+                <a:rPr lang="en-US" baseline="-25000" dirty="0"/>
+                <a:t>2</a:t>
+              </a:r>
+              <a:r>
+                <a:rPr lang="en-US" dirty="0"/>
+                <a:t>)=1.0</a:t>
+              </a:r>
+            </a:p>
+          </p:txBody>
+        </p:sp>
+        <p:sp>
+          <p:nvSpPr>
+            <p:cNvPr id="10" name="Line 7"/>
+            <p:cNvSpPr>
+              <a:spLocks noChangeShapeType="1"/>
+            </p:cNvSpPr>
+            <p:nvPr/>
+          </p:nvSpPr>
+          <p:spPr bwMode="auto">
+            <a:xfrm flipV="1">
+              <a:off x="6672263" y="5492751"/>
+              <a:ext cx="371474" cy="454025"/>
+            </a:xfrm>
+            <a:prstGeom prst="line">
+              <a:avLst/>
+            </a:prstGeom>
+            <a:noFill/>
+            <a:ln w="22225">
+              <a:solidFill>
+                <a:srgbClr val="FF0000"/>
+              </a:solidFill>
+              <a:round/>
+              <a:headEnd/>
+              <a:tailEnd type="triangle" w="med" len="lg"/>
+            </a:ln>
+            <a:effectLst/>
+            <a:extLst>
+              <a:ext uri="{909E8E84-426E-40DD-AFC4-6F175D3DCCD1}">
+                <a14:hiddenFill xmlns:a14="http://schemas.microsoft.com/office/drawing/2010/main">
+                  <a:noFill/>
+                </a14:hiddenFill>
+              </a:ext>
+              <a:ext uri="{AF507438-7753-43E0-B8FC-AC1667EBCBE1}">
+                <a14:hiddenEffects xmlns:a14="http://schemas.microsoft.com/office/drawing/2010/main">
+                  <a:effectLst>
+                    <a:outerShdw dist="35921" dir="2700000" algn="ctr" rotWithShape="0">
+                      <a:schemeClr val="bg2"/>
+                    </a:outerShdw>
+                  </a:effectLst>
+                </a14:hiddenEffects>
+              </a:ext>
+            </a:extLst>
+          </p:spPr>
+          <p:txBody>
+            <a:bodyPr/>
+            <a:lstStyle/>
+            <a:p>
+              <a:endParaRPr lang="en-US"/>
+            </a:p>
+          </p:txBody>
+        </p:sp>
+        <p:sp>
+          <p:nvSpPr>
+            <p:cNvPr id="3" name="Rectangle 2">
+              <a:extLst>
+                <a:ext uri="{FF2B5EF4-FFF2-40B4-BE49-F238E27FC236}">
+                  <a16:creationId xmlns:a16="http://schemas.microsoft.com/office/drawing/2014/main" id="{0C3924D8-FD64-BA34-C7DE-9C3DCDB32A13}"/>
+                </a:ext>
+              </a:extLst>
+            </p:cNvPr>
+            <p:cNvSpPr/>
+            <p:nvPr/>
+          </p:nvSpPr>
+          <p:spPr>
+            <a:xfrm>
+              <a:off x="9008198" y="1724098"/>
+              <a:ext cx="1258432" cy="641350"/>
+            </a:xfrm>
+            <a:prstGeom prst="rect">
+              <a:avLst/>
+            </a:prstGeom>
             <a:solidFill>
-              <a:srgbClr val="FF0000"/>
+              <a:schemeClr val="bg1"/>
             </a:solidFill>
-            <a:round/>
-            <a:headEnd/>
-            <a:tailEnd type="triangle" w="med" len="lg"/>
-          </a:ln>
-          <a:effectLst/>
-          <a:extLst>
-            <a:ext uri="{909E8E84-426E-40DD-AFC4-6F175D3DCCD1}">
-              <a14:hiddenFill xmlns:a14="http://schemas.microsoft.com/office/drawing/2010/main">
-                <a:noFill/>
-              </a14:hiddenFill>
-            </a:ext>
-            <a:ext uri="{AF507438-7753-43E0-B8FC-AC1667EBCBE1}">
-              <a14:hiddenEffects xmlns:a14="http://schemas.microsoft.com/office/drawing/2010/main">
-                <a:effectLst>
-                  <a:outerShdw dist="35921" dir="2700000" algn="ctr" rotWithShape="0">
-                    <a:schemeClr val="bg2"/>
-                  </a:outerShdw>
-                </a:effectLst>
-              </a14:hiddenEffects>
-            </a:ext>
-          </a:extLst>
-        </p:spPr>
-        <p:txBody>
-          <a:bodyPr/>
-          <a:lstStyle/>
-          <a:p>
-            <a:endParaRPr lang="en-US"/>
-          </a:p>
-        </p:txBody>
-      </p:sp>
-      <p:sp>
-        <p:nvSpPr>
-          <p:cNvPr id="2" name="TextBox 1"/>
-          <p:cNvSpPr txBox="1"/>
-          <p:nvPr/>
-        </p:nvSpPr>
-        <p:spPr>
-          <a:xfrm>
-            <a:off x="6300788" y="5956300"/>
-            <a:ext cx="1283353" cy="369332"/>
-          </a:xfrm>
-          <a:prstGeom prst="rect">
-            <a:avLst/>
-          </a:prstGeom>
-          <a:noFill/>
-        </p:spPr>
-        <p:txBody>
-          <a:bodyPr wrap="square" rtlCol="0">
-            <a:spAutoFit/>
-          </a:bodyPr>
-          <a:lstStyle/>
-          <a:p>
-            <a:r>
-              <a:rPr lang="en-US" dirty="0"/>
-              <a:t>r(x</a:t>
-            </a:r>
-            <a:r>
-              <a:rPr lang="en-US" baseline="-25000" dirty="0"/>
-              <a:t>1</a:t>
-            </a:r>
-            <a:r>
-              <a:rPr lang="en-US" dirty="0"/>
-              <a:t>,x</a:t>
-            </a:r>
-            <a:r>
-              <a:rPr lang="en-US" baseline="-25000" dirty="0"/>
-              <a:t>2</a:t>
-            </a:r>
-            <a:r>
-              <a:rPr lang="en-US" dirty="0"/>
-              <a:t>)=1.0</a:t>
-            </a:r>
-          </a:p>
-        </p:txBody>
-      </p:sp>
-      <p:sp>
-        <p:nvSpPr>
-          <p:cNvPr id="10" name="Line 7"/>
-          <p:cNvSpPr>
-            <a:spLocks noChangeShapeType="1"/>
-          </p:cNvSpPr>
-          <p:nvPr/>
-        </p:nvSpPr>
-        <p:spPr bwMode="auto">
-          <a:xfrm flipV="1">
-            <a:off x="6672263" y="5492751"/>
-            <a:ext cx="371474" cy="454025"/>
-          </a:xfrm>
-          <a:prstGeom prst="line">
-            <a:avLst/>
-          </a:prstGeom>
-          <a:noFill/>
-          <a:ln w="22225">
-            <a:solidFill>
-              <a:srgbClr val="FF0000"/>
-            </a:solidFill>
-            <a:round/>
-            <a:headEnd/>
-            <a:tailEnd type="triangle" w="med" len="lg"/>
-          </a:ln>
-          <a:effectLst/>
-          <a:extLst>
-            <a:ext uri="{909E8E84-426E-40DD-AFC4-6F175D3DCCD1}">
-              <a14:hiddenFill xmlns:a14="http://schemas.microsoft.com/office/drawing/2010/main">
-                <a:noFill/>
-              </a14:hiddenFill>
-            </a:ext>
-            <a:ext uri="{AF507438-7753-43E0-B8FC-AC1667EBCBE1}">
-              <a14:hiddenEffects xmlns:a14="http://schemas.microsoft.com/office/drawing/2010/main">
-                <a:effectLst>
-                  <a:outerShdw dist="35921" dir="2700000" algn="ctr" rotWithShape="0">
-                    <a:schemeClr val="bg2"/>
-                  </a:outerShdw>
-                </a:effectLst>
-              </a14:hiddenEffects>
-            </a:ext>
-          </a:extLst>
-        </p:spPr>
-        <p:txBody>
-          <a:bodyPr/>
-          <a:lstStyle/>
-          <a:p>
-            <a:endParaRPr lang="en-US"/>
-          </a:p>
-        </p:txBody>
-      </p:sp>
+            <a:ln>
+              <a:noFill/>
+            </a:ln>
+          </p:spPr>
+          <p:style>
+            <a:lnRef idx="2">
+              <a:schemeClr val="accent1">
+                <a:shade val="15000"/>
+              </a:schemeClr>
+            </a:lnRef>
+            <a:fillRef idx="1">
+              <a:schemeClr val="accent1"/>
+            </a:fillRef>
+            <a:effectRef idx="0">
+              <a:schemeClr val="accent1"/>
+            </a:effectRef>
+            <a:fontRef idx="minor">
+              <a:schemeClr val="lt1"/>
+            </a:fontRef>
+          </p:style>
+          <p:txBody>
+            <a:bodyPr rtlCol="0" anchor="ctr"/>
+            <a:lstStyle/>
+            <a:p>
+              <a:pPr algn="ctr"/>
+              <a:endParaRPr lang="en-CA"/>
+            </a:p>
+          </p:txBody>
+        </p:sp>
+        <p:sp>
+          <p:nvSpPr>
+            <p:cNvPr id="4" name="Text Box 6">
+              <a:extLst>
+                <a:ext uri="{FF2B5EF4-FFF2-40B4-BE49-F238E27FC236}">
+                  <a16:creationId xmlns:a16="http://schemas.microsoft.com/office/drawing/2014/main" id="{1C993864-C616-4DC0-0241-11ACFA0F5112}"/>
+                </a:ext>
+              </a:extLst>
+            </p:cNvPr>
+            <p:cNvSpPr txBox="1">
+              <a:spLocks noChangeArrowheads="1"/>
+            </p:cNvSpPr>
+            <p:nvPr/>
+          </p:nvSpPr>
+          <p:spPr bwMode="auto">
+            <a:xfrm>
+              <a:off x="8202705" y="1770787"/>
+              <a:ext cx="2133600" cy="646331"/>
+            </a:xfrm>
+            <a:prstGeom prst="rect">
+              <a:avLst/>
+            </a:prstGeom>
+            <a:noFill/>
+            <a:ln>
+              <a:noFill/>
+            </a:ln>
+            <a:effectLst/>
+            <a:extLst>
+              <a:ext uri="{909E8E84-426E-40DD-AFC4-6F175D3DCCD1}">
+                <a14:hiddenFill xmlns:a14="http://schemas.microsoft.com/office/drawing/2010/main">
+                  <a:solidFill>
+                    <a:srgbClr val="FFFFFF"/>
+                  </a:solidFill>
+                </a14:hiddenFill>
+              </a:ext>
+              <a:ext uri="{91240B29-F687-4F45-9708-019B960494DF}">
+                <a14:hiddenLine xmlns:a14="http://schemas.microsoft.com/office/drawing/2010/main" w="22225" algn="ctr">
+                  <a:solidFill>
+                    <a:srgbClr val="FF0000"/>
+                  </a:solidFill>
+                  <a:miter lim="800000"/>
+                  <a:headEnd/>
+                  <a:tailEnd type="none" w="med" len="lg"/>
+                </a14:hiddenLine>
+              </a:ext>
+              <a:ext uri="{AF507438-7753-43E0-B8FC-AC1667EBCBE1}">
+                <a14:hiddenEffects xmlns:a14="http://schemas.microsoft.com/office/drawing/2010/main">
+                  <a:effectLst>
+                    <a:outerShdw dist="35921" dir="2700000" algn="ctr" rotWithShape="0">
+                      <a:schemeClr val="bg2"/>
+                    </a:outerShdw>
+                  </a:effectLst>
+                </a14:hiddenEffects>
+              </a:ext>
+            </a:extLst>
+          </p:spPr>
+          <p:txBody>
+            <a:bodyPr>
+              <a:spAutoFit/>
+            </a:bodyPr>
+            <a:lstStyle/>
+            <a:p>
+              <a:pPr>
+                <a:spcBef>
+                  <a:spcPct val="50000"/>
+                </a:spcBef>
+              </a:pPr>
+              <a:r>
+                <a:rPr lang="en-US" altLang="en-US" dirty="0">
+                  <a:latin typeface="Arial" pitchFamily="34" charset="0"/>
+                </a:rPr>
+                <a:t>Alternative least squares planes</a:t>
+              </a:r>
+            </a:p>
+          </p:txBody>
+        </p:sp>
+      </p:grpSp>
     </p:spTree>
   </p:cSld>
   <p:clrMapOvr>
@@ -4851,156 +5006,343 @@
           </a:p>
         </p:txBody>
       </p:sp>
+      <p:grpSp>
+        <p:nvGrpSpPr>
+          <p:cNvPr id="4" name="Group 3">
+            <a:extLst>
+              <a:ext uri="{FF2B5EF4-FFF2-40B4-BE49-F238E27FC236}">
+                <a16:creationId xmlns:a16="http://schemas.microsoft.com/office/drawing/2014/main" id="{FF2F3024-494B-DD2D-2D3D-3CB34A648AD5}"/>
+              </a:ext>
+            </a:extLst>
+          </p:cNvPr>
+          <p:cNvGrpSpPr/>
+          <p:nvPr/>
+        </p:nvGrpSpPr>
+        <p:grpSpPr>
+          <a:xfrm>
+            <a:off x="5029200" y="1676401"/>
+            <a:ext cx="5105400" cy="4621213"/>
+            <a:chOff x="5029200" y="1676401"/>
+            <a:chExt cx="5105400" cy="4621213"/>
+          </a:xfrm>
+        </p:grpSpPr>
+        <p:pic>
+          <p:nvPicPr>
+            <p:cNvPr id="18436" name="Picture 4" descr="3cases-c"/>
+            <p:cNvPicPr>
+              <a:picLocks noChangeAspect="1" noChangeArrowheads="1"/>
+            </p:cNvPicPr>
+            <p:nvPr/>
+          </p:nvPicPr>
+          <p:blipFill>
+            <a:blip r:embed="rId3">
+              <a:extLst>
+                <a:ext uri="{28A0092B-C50C-407E-A947-70E740481C1C}">
+                  <a14:useLocalDpi xmlns:a14="http://schemas.microsoft.com/office/drawing/2010/main" val="0"/>
+                </a:ext>
+              </a:extLst>
+            </a:blip>
+            <a:srcRect/>
+            <a:stretch>
+              <a:fillRect/>
+            </a:stretch>
+          </p:blipFill>
+          <p:spPr bwMode="auto">
+            <a:xfrm>
+              <a:off x="5029200" y="1676401"/>
+              <a:ext cx="5105400" cy="4621213"/>
+            </a:xfrm>
+            <a:prstGeom prst="rect">
+              <a:avLst/>
+            </a:prstGeom>
+            <a:noFill/>
+            <a:extLst>
+              <a:ext uri="{909E8E84-426E-40DD-AFC4-6F175D3DCCD1}">
+                <a14:hiddenFill xmlns:a14="http://schemas.microsoft.com/office/drawing/2010/main">
+                  <a:solidFill>
+                    <a:srgbClr val="FFFFFF"/>
+                  </a:solidFill>
+                </a14:hiddenFill>
+              </a:ext>
+            </a:extLst>
+          </p:spPr>
+        </p:pic>
+        <p:sp>
+          <p:nvSpPr>
+            <p:cNvPr id="18438" name="Line 6"/>
+            <p:cNvSpPr>
+              <a:spLocks noChangeShapeType="1"/>
+            </p:cNvSpPr>
+            <p:nvPr/>
+          </p:nvSpPr>
+          <p:spPr bwMode="auto">
+            <a:xfrm>
+              <a:off x="6629400" y="4724400"/>
+              <a:ext cx="2209800" cy="1066800"/>
+            </a:xfrm>
+            <a:prstGeom prst="line">
+              <a:avLst/>
+            </a:prstGeom>
+            <a:noFill/>
+            <a:ln w="22225">
+              <a:solidFill>
+                <a:srgbClr val="FF0000"/>
+              </a:solidFill>
+              <a:round/>
+              <a:headEnd/>
+              <a:tailEnd type="none" w="med" len="lg"/>
+            </a:ln>
+            <a:effectLst/>
+            <a:extLst>
+              <a:ext uri="{909E8E84-426E-40DD-AFC4-6F175D3DCCD1}">
+                <a14:hiddenFill xmlns:a14="http://schemas.microsoft.com/office/drawing/2010/main">
+                  <a:noFill/>
+                </a14:hiddenFill>
+              </a:ext>
+              <a:ext uri="{AF507438-7753-43E0-B8FC-AC1667EBCBE1}">
+                <a14:hiddenEffects xmlns:a14="http://schemas.microsoft.com/office/drawing/2010/main">
+                  <a:effectLst>
+                    <a:outerShdw dist="35921" dir="2700000" algn="ctr" rotWithShape="0">
+                      <a:schemeClr val="bg2"/>
+                    </a:outerShdw>
+                  </a:effectLst>
+                </a14:hiddenEffects>
+              </a:ext>
+            </a:extLst>
+          </p:spPr>
+          <p:txBody>
+            <a:bodyPr/>
+            <a:lstStyle/>
+            <a:p>
+              <a:endParaRPr lang="en-US"/>
+            </a:p>
+          </p:txBody>
+        </p:sp>
+        <p:sp>
+          <p:nvSpPr>
+            <p:cNvPr id="2" name="Oval 1">
+              <a:extLst>
+                <a:ext uri="{FF2B5EF4-FFF2-40B4-BE49-F238E27FC236}">
+                  <a16:creationId xmlns:a16="http://schemas.microsoft.com/office/drawing/2014/main" id="{BD5C3AC5-8E16-7895-E3C2-4B878CBCE16D}"/>
+                </a:ext>
+              </a:extLst>
+            </p:cNvPr>
+            <p:cNvSpPr/>
+            <p:nvPr/>
+          </p:nvSpPr>
+          <p:spPr>
+            <a:xfrm rot="1560000">
+              <a:off x="6397945" y="5007124"/>
+              <a:ext cx="2661719" cy="479834"/>
+            </a:xfrm>
+            <a:prstGeom prst="ellipse">
+              <a:avLst/>
+            </a:prstGeom>
+            <a:noFill/>
+            <a:ln w="34925">
+              <a:solidFill>
+                <a:srgbClr val="FF0000"/>
+              </a:solidFill>
+            </a:ln>
+          </p:spPr>
+          <p:style>
+            <a:lnRef idx="2">
+              <a:schemeClr val="accent1">
+                <a:shade val="15000"/>
+              </a:schemeClr>
+            </a:lnRef>
+            <a:fillRef idx="1">
+              <a:schemeClr val="accent1"/>
+            </a:fillRef>
+            <a:effectRef idx="0">
+              <a:schemeClr val="accent1"/>
+            </a:effectRef>
+            <a:fontRef idx="minor">
+              <a:schemeClr val="lt1"/>
+            </a:fontRef>
+          </p:style>
+          <p:txBody>
+            <a:bodyPr rtlCol="0" anchor="ctr"/>
+            <a:lstStyle/>
+            <a:p>
+              <a:pPr algn="ctr"/>
+              <a:endParaRPr lang="en-CA"/>
+            </a:p>
+          </p:txBody>
+        </p:sp>
+        <p:sp>
+          <p:nvSpPr>
+            <p:cNvPr id="3" name="TextBox 2">
+              <a:extLst>
+                <a:ext uri="{FF2B5EF4-FFF2-40B4-BE49-F238E27FC236}">
+                  <a16:creationId xmlns:a16="http://schemas.microsoft.com/office/drawing/2014/main" id="{CAB963E7-155C-2850-7685-1FF49F297DD1}"/>
+                </a:ext>
+              </a:extLst>
+            </p:cNvPr>
+            <p:cNvSpPr txBox="1"/>
+            <p:nvPr/>
+          </p:nvSpPr>
+          <p:spPr>
+            <a:xfrm>
+              <a:off x="8724845" y="5849936"/>
+              <a:ext cx="1347899" cy="369332"/>
+            </a:xfrm>
+            <a:prstGeom prst="rect">
+              <a:avLst/>
+            </a:prstGeom>
+            <a:noFill/>
+          </p:spPr>
+          <p:txBody>
+            <a:bodyPr wrap="square" rtlCol="0">
+              <a:spAutoFit/>
+            </a:bodyPr>
+            <a:lstStyle/>
+            <a:p>
+              <a:r>
+                <a:rPr lang="en-US" dirty="0"/>
+                <a:t>r(x</a:t>
+              </a:r>
+              <a:r>
+                <a:rPr lang="en-US" baseline="-25000" dirty="0"/>
+                <a:t>1</a:t>
+              </a:r>
+              <a:r>
+                <a:rPr lang="en-US" dirty="0"/>
+                <a:t>,x</a:t>
+              </a:r>
+              <a:r>
+                <a:rPr lang="en-US" baseline="-25000" dirty="0"/>
+                <a:t>2</a:t>
+              </a:r>
+              <a:r>
+                <a:rPr lang="en-US" dirty="0"/>
+                <a:t>) = 0.9</a:t>
+              </a:r>
+            </a:p>
+          </p:txBody>
+        </p:sp>
+      </p:grpSp>
+    </p:spTree>
+  </p:cSld>
+  <p:clrMapOvr>
+    <a:masterClrMapping/>
+  </p:clrMapOvr>
+</p:sld>
+</file>
+
+<file path=ppt/slides/slide4.xml><?xml version="1.0" encoding="utf-8"?>
+<p:sld xmlns:a="http://schemas.openxmlformats.org/drawingml/2006/main" xmlns:r="http://schemas.openxmlformats.org/officeDocument/2006/relationships" xmlns:p="http://schemas.openxmlformats.org/presentationml/2006/main">
+  <p:cSld>
+    <p:spTree>
+      <p:nvGrpSpPr>
+        <p:cNvPr id="1" name=""/>
+        <p:cNvGrpSpPr/>
+        <p:nvPr/>
+      </p:nvGrpSpPr>
+      <p:grpSpPr>
+        <a:xfrm>
+          <a:off x="0" y="0"/>
+          <a:ext cx="0" cy="0"/>
+          <a:chOff x="0" y="0"/>
+          <a:chExt cx="0" cy="0"/>
+        </a:xfrm>
+      </p:grpSpPr>
       <p:pic>
         <p:nvPicPr>
-          <p:cNvPr id="18436" name="Picture 4" descr="3cases-c"/>
+          <p:cNvPr id="20" name="Picture 19">
+            <a:extLst>
+              <a:ext uri="{FF2B5EF4-FFF2-40B4-BE49-F238E27FC236}">
+                <a16:creationId xmlns:a16="http://schemas.microsoft.com/office/drawing/2014/main" id="{3E5826FF-29B9-1753-8679-503F65678F66}"/>
+              </a:ext>
+            </a:extLst>
+          </p:cNvPr>
           <p:cNvPicPr>
-            <a:picLocks noChangeAspect="1" noChangeArrowheads="1"/>
+            <a:picLocks noChangeAspect="1"/>
           </p:cNvPicPr>
           <p:nvPr/>
         </p:nvPicPr>
         <p:blipFill>
-          <a:blip r:embed="rId3">
-            <a:extLst>
-              <a:ext uri="{28A0092B-C50C-407E-A947-70E740481C1C}">
-                <a14:useLocalDpi xmlns:a14="http://schemas.microsoft.com/office/drawing/2010/main" val="0"/>
-              </a:ext>
-            </a:extLst>
-          </a:blip>
-          <a:srcRect/>
+          <a:blip r:embed="rId2"/>
           <a:stretch>
             <a:fillRect/>
           </a:stretch>
         </p:blipFill>
-        <p:spPr bwMode="auto">
+        <p:spPr>
           <a:xfrm>
-            <a:off x="5029200" y="1676401"/>
-            <a:ext cx="5105400" cy="4621213"/>
+            <a:off x="945189" y="2024662"/>
+            <a:ext cx="3420000" cy="3042002"/>
           </a:xfrm>
           <a:prstGeom prst="rect">
             <a:avLst/>
           </a:prstGeom>
-          <a:noFill/>
-          <a:extLst>
-            <a:ext uri="{909E8E84-426E-40DD-AFC4-6F175D3DCCD1}">
-              <a14:hiddenFill xmlns:a14="http://schemas.microsoft.com/office/drawing/2010/main">
-                <a:solidFill>
-                  <a:srgbClr val="FFFFFF"/>
-                </a:solidFill>
-              </a14:hiddenFill>
-            </a:ext>
-          </a:extLst>
         </p:spPr>
       </p:pic>
-      <p:sp>
-        <p:nvSpPr>
-          <p:cNvPr id="18438" name="Line 6"/>
-          <p:cNvSpPr>
-            <a:spLocks noChangeShapeType="1"/>
-          </p:cNvSpPr>
+      <p:pic>
+        <p:nvPicPr>
+          <p:cNvPr id="22" name="Picture 21">
+            <a:extLst>
+              <a:ext uri="{FF2B5EF4-FFF2-40B4-BE49-F238E27FC236}">
+                <a16:creationId xmlns:a16="http://schemas.microsoft.com/office/drawing/2014/main" id="{A21844E9-219E-4525-8EB8-5DC6A543BEFD}"/>
+              </a:ext>
+            </a:extLst>
+          </p:cNvPr>
+          <p:cNvPicPr>
+            <a:picLocks noChangeAspect="1"/>
+          </p:cNvPicPr>
           <p:nvPr/>
-        </p:nvSpPr>
-        <p:spPr bwMode="auto">
+        </p:nvPicPr>
+        <p:blipFill>
+          <a:blip r:embed="rId3"/>
+          <a:stretch>
+            <a:fillRect/>
+          </a:stretch>
+        </p:blipFill>
+        <p:spPr>
           <a:xfrm>
-            <a:off x="6629400" y="4724400"/>
-            <a:ext cx="2209800" cy="1066800"/>
+            <a:off x="4430240" y="1948877"/>
+            <a:ext cx="3456000" cy="3219529"/>
           </a:xfrm>
-          <a:prstGeom prst="line">
+          <a:prstGeom prst="rect">
             <a:avLst/>
           </a:prstGeom>
-          <a:noFill/>
-          <a:ln w="22225">
-            <a:solidFill>
-              <a:srgbClr val="FF0000"/>
-            </a:solidFill>
-            <a:round/>
-            <a:headEnd/>
-            <a:tailEnd type="none" w="med" len="lg"/>
-          </a:ln>
-          <a:effectLst/>
-          <a:extLst>
-            <a:ext uri="{909E8E84-426E-40DD-AFC4-6F175D3DCCD1}">
-              <a14:hiddenFill xmlns:a14="http://schemas.microsoft.com/office/drawing/2010/main">
-                <a:noFill/>
-              </a14:hiddenFill>
-            </a:ext>
-            <a:ext uri="{AF507438-7753-43E0-B8FC-AC1667EBCBE1}">
-              <a14:hiddenEffects xmlns:a14="http://schemas.microsoft.com/office/drawing/2010/main">
-                <a:effectLst>
-                  <a:outerShdw dist="35921" dir="2700000" algn="ctr" rotWithShape="0">
-                    <a:schemeClr val="bg2"/>
-                  </a:outerShdw>
-                </a:effectLst>
-              </a14:hiddenEffects>
-            </a:ext>
-          </a:extLst>
         </p:spPr>
-        <p:txBody>
-          <a:bodyPr/>
-          <a:lstStyle/>
-          <a:p>
-            <a:endParaRPr lang="en-US"/>
-          </a:p>
-        </p:txBody>
-      </p:sp>
-      <p:sp>
-        <p:nvSpPr>
-          <p:cNvPr id="2" name="Oval 1">
-            <a:extLst>
-              <a:ext uri="{FF2B5EF4-FFF2-40B4-BE49-F238E27FC236}">
-                <a16:creationId xmlns:a16="http://schemas.microsoft.com/office/drawing/2014/main" id="{BD5C3AC5-8E16-7895-E3C2-4B878CBCE16D}"/>
-              </a:ext>
-            </a:extLst>
-          </p:cNvPr>
-          <p:cNvSpPr/>
+      </p:pic>
+      <p:pic>
+        <p:nvPicPr>
+          <p:cNvPr id="24" name="Picture 23">
+            <a:extLst>
+              <a:ext uri="{FF2B5EF4-FFF2-40B4-BE49-F238E27FC236}">
+                <a16:creationId xmlns:a16="http://schemas.microsoft.com/office/drawing/2014/main" id="{DF9F3D09-5632-DB3D-D2BD-D3D81A5AC720}"/>
+              </a:ext>
+            </a:extLst>
+          </p:cNvPr>
+          <p:cNvPicPr>
+            <a:picLocks noChangeAspect="1"/>
+          </p:cNvPicPr>
           <p:nvPr/>
-        </p:nvSpPr>
+        </p:nvPicPr>
+        <p:blipFill>
+          <a:blip r:embed="rId4"/>
+          <a:stretch>
+            <a:fillRect/>
+          </a:stretch>
+        </p:blipFill>
         <p:spPr>
-          <a:xfrm rot="1560000">
-            <a:off x="6397945" y="5007124"/>
-            <a:ext cx="2661719" cy="479834"/>
+          <a:xfrm>
+            <a:off x="7916473" y="1945713"/>
+            <a:ext cx="3420000" cy="3192001"/>
           </a:xfrm>
-          <a:prstGeom prst="ellipse">
+          <a:prstGeom prst="rect">
             <a:avLst/>
           </a:prstGeom>
-          <a:noFill/>
-          <a:ln w="34925">
-            <a:solidFill>
-              <a:srgbClr val="FF0000"/>
-            </a:solidFill>
-          </a:ln>
         </p:spPr>
-        <p:style>
-          <a:lnRef idx="2">
-            <a:schemeClr val="accent1">
-              <a:shade val="15000"/>
-            </a:schemeClr>
-          </a:lnRef>
-          <a:fillRef idx="1">
-            <a:schemeClr val="accent1"/>
-          </a:fillRef>
-          <a:effectRef idx="0">
-            <a:schemeClr val="accent1"/>
-          </a:effectRef>
-          <a:fontRef idx="minor">
-            <a:schemeClr val="lt1"/>
-          </a:fontRef>
-        </p:style>
-        <p:txBody>
-          <a:bodyPr rtlCol="0" anchor="ctr"/>
-          <a:lstStyle/>
-          <a:p>
-            <a:pPr algn="ctr"/>
-            <a:endParaRPr lang="en-CA"/>
-          </a:p>
-        </p:txBody>
-      </p:sp>
-      <p:sp>
-        <p:nvSpPr>
-          <p:cNvPr id="3" name="TextBox 2">
-            <a:extLst>
-              <a:ext uri="{FF2B5EF4-FFF2-40B4-BE49-F238E27FC236}">
-                <a16:creationId xmlns:a16="http://schemas.microsoft.com/office/drawing/2014/main" id="{CAB963E7-155C-2850-7685-1FF49F297DD1}"/>
+      </p:pic>
+      <p:sp>
+        <p:nvSpPr>
+          <p:cNvPr id="25" name="TextBox 24">
+            <a:extLst>
+              <a:ext uri="{FF2B5EF4-FFF2-40B4-BE49-F238E27FC236}">
+                <a16:creationId xmlns:a16="http://schemas.microsoft.com/office/drawing/2014/main" id="{CD338CD0-DBB8-C06D-DF16-CAD2340590BA}"/>
               </a:ext>
             </a:extLst>
           </p:cNvPr>
@@ -5009,8 +5351,8 @@
         </p:nvSpPr>
         <p:spPr>
           <a:xfrm>
-            <a:off x="8724845" y="5849936"/>
-            <a:ext cx="1347899" cy="369332"/>
+            <a:off x="1028368" y="1447364"/>
+            <a:ext cx="748937" cy="369332"/>
           </a:xfrm>
           <a:prstGeom prst="rect">
             <a:avLst/>
@@ -5023,30 +5365,92 @@
           </a:bodyPr>
           <a:lstStyle/>
           <a:p>
-            <a:r>
-              <a:rPr lang="en-US" dirty="0"/>
-              <a:t>r(x</a:t>
-            </a:r>
-            <a:r>
-              <a:rPr lang="en-US" baseline="-25000" dirty="0"/>
-              <a:t>1</a:t>
-            </a:r>
-            <a:r>
-              <a:rPr lang="en-US" dirty="0"/>
-              <a:t>,x</a:t>
-            </a:r>
-            <a:r>
-              <a:rPr lang="en-US" baseline="-25000" dirty="0"/>
-              <a:t>2</a:t>
-            </a:r>
-            <a:r>
-              <a:rPr lang="en-US" dirty="0"/>
-              <a:t>) = 0.9</a:t>
+            <a:pPr algn="ctr"/>
+            <a:r>
+              <a:rPr lang="en-CA" dirty="0"/>
+              <a:t>(a)</a:t>
+            </a:r>
+          </a:p>
+        </p:txBody>
+      </p:sp>
+      <p:sp>
+        <p:nvSpPr>
+          <p:cNvPr id="26" name="TextBox 25">
+            <a:extLst>
+              <a:ext uri="{FF2B5EF4-FFF2-40B4-BE49-F238E27FC236}">
+                <a16:creationId xmlns:a16="http://schemas.microsoft.com/office/drawing/2014/main" id="{22370D03-4C38-91E1-3871-6406EA9A616F}"/>
+              </a:ext>
+            </a:extLst>
+          </p:cNvPr>
+          <p:cNvSpPr txBox="1"/>
+          <p:nvPr/>
+        </p:nvSpPr>
+        <p:spPr>
+          <a:xfrm>
+            <a:off x="4424145" y="1447364"/>
+            <a:ext cx="748937" cy="369332"/>
+          </a:xfrm>
+          <a:prstGeom prst="rect">
+            <a:avLst/>
+          </a:prstGeom>
+          <a:noFill/>
+        </p:spPr>
+        <p:txBody>
+          <a:bodyPr wrap="square" rtlCol="0">
+            <a:spAutoFit/>
+          </a:bodyPr>
+          <a:lstStyle/>
+          <a:p>
+            <a:pPr algn="ctr"/>
+            <a:r>
+              <a:rPr lang="en-CA" dirty="0"/>
+              <a:t>(b)</a:t>
+            </a:r>
+          </a:p>
+        </p:txBody>
+      </p:sp>
+      <p:sp>
+        <p:nvSpPr>
+          <p:cNvPr id="27" name="TextBox 26">
+            <a:extLst>
+              <a:ext uri="{FF2B5EF4-FFF2-40B4-BE49-F238E27FC236}">
+                <a16:creationId xmlns:a16="http://schemas.microsoft.com/office/drawing/2014/main" id="{3CA76B0A-69B5-9368-650A-92678A38F327}"/>
+              </a:ext>
+            </a:extLst>
+          </p:cNvPr>
+          <p:cNvSpPr txBox="1"/>
+          <p:nvPr/>
+        </p:nvSpPr>
+        <p:spPr>
+          <a:xfrm>
+            <a:off x="7916080" y="1447364"/>
+            <a:ext cx="748937" cy="369332"/>
+          </a:xfrm>
+          <a:prstGeom prst="rect">
+            <a:avLst/>
+          </a:prstGeom>
+          <a:noFill/>
+        </p:spPr>
+        <p:txBody>
+          <a:bodyPr wrap="square" rtlCol="0">
+            <a:spAutoFit/>
+          </a:bodyPr>
+          <a:lstStyle/>
+          <a:p>
+            <a:pPr algn="ctr"/>
+            <a:r>
+              <a:rPr lang="en-CA" dirty="0"/>
+              <a:t>(c)</a:t>
             </a:r>
           </a:p>
         </p:txBody>
       </p:sp>
     </p:spTree>
+    <p:extLst>
+      <p:ext uri="{BB962C8B-B14F-4D97-AF65-F5344CB8AC3E}">
+        <p14:creationId xmlns:p14="http://schemas.microsoft.com/office/powerpoint/2010/main" val="1797824832"/>
+      </p:ext>
+    </p:extLst>
   </p:cSld>
   <p:clrMapOvr>
     <a:masterClrMapping/>

</xml_diff>